<commit_message>
Add Rules training and fix typos in some files
</commit_message>
<xml_diff>
--- a/03_KULeuven-testbed-infrastructuur.pptx
+++ b/03_KULeuven-testbed-infrastructuur.pptx
@@ -6,10 +6,10 @@
     <p:sldMasterId id="2147483694" r:id="rId2"/>
   </p:sldMasterIdLst>
   <p:notesMasterIdLst>
-    <p:notesMasterId r:id="rId13"/>
+    <p:notesMasterId r:id="rId14"/>
   </p:notesMasterIdLst>
   <p:handoutMasterIdLst>
-    <p:handoutMasterId r:id="rId14"/>
+    <p:handoutMasterId r:id="rId15"/>
   </p:handoutMasterIdLst>
   <p:sldIdLst>
     <p:sldId id="261" r:id="rId3"/>
@@ -21,7 +21,8 @@
     <p:sldId id="527" r:id="rId9"/>
     <p:sldId id="528" r:id="rId10"/>
     <p:sldId id="526" r:id="rId11"/>
-    <p:sldId id="529" r:id="rId12"/>
+    <p:sldId id="530" r:id="rId12"/>
+    <p:sldId id="529" r:id="rId13"/>
   </p:sldIdLst>
   <p:sldSz cx="12192000" cy="6858000"/>
   <p:notesSz cx="6858000" cy="9144000"/>
@@ -213,7 +214,7 @@
           <a:p>
             <a:fld id="{8F591CCF-F6FD-734B-854A-5BC033593B1E}" type="datetimeFigureOut">
               <a:rPr lang="nl-NL" smtClean="0"/>
-              <a:t>26-4-2021</a:t>
+              <a:t>27-4-2021</a:t>
             </a:fld>
             <a:endParaRPr lang="nl-NL"/>
           </a:p>
@@ -378,7 +379,7 @@
           <a:p>
             <a:fld id="{23C66214-DB21-4647-B5DA-0D17CA592867}" type="datetimeFigureOut">
               <a:rPr lang="nl-NL" smtClean="0"/>
-              <a:t>26-4-2021</a:t>
+              <a:t>27-4-2021</a:t>
             </a:fld>
             <a:endParaRPr lang="nl-NL"/>
           </a:p>
@@ -820,7 +821,7 @@
           <a:p>
             <a:fld id="{F041F224-4157-43B9-983D-12BB641F44A6}" type="datetime1">
               <a:rPr lang="nl-NL" smtClean="0"/>
-              <a:t>26-4-2021</a:t>
+              <a:t>27-4-2021</a:t>
             </a:fld>
             <a:endParaRPr lang="nl-NL"/>
           </a:p>
@@ -975,7 +976,7 @@
           <a:p>
             <a:fld id="{F041F224-4157-43B9-983D-12BB641F44A6}" type="datetime1">
               <a:rPr lang="nl-NL" smtClean="0"/>
-              <a:t>26-4-2021</a:t>
+              <a:t>27-4-2021</a:t>
             </a:fld>
             <a:endParaRPr lang="nl-NL"/>
           </a:p>
@@ -1130,7 +1131,7 @@
           <a:p>
             <a:fld id="{F041F224-4157-43B9-983D-12BB641F44A6}" type="datetime1">
               <a:rPr lang="nl-NL" smtClean="0"/>
-              <a:t>26-4-2021</a:t>
+              <a:t>27-4-2021</a:t>
             </a:fld>
             <a:endParaRPr lang="nl-NL"/>
           </a:p>
@@ -1285,7 +1286,7 @@
           <a:p>
             <a:fld id="{F041F224-4157-43B9-983D-12BB641F44A6}" type="datetime1">
               <a:rPr lang="nl-NL" smtClean="0"/>
-              <a:t>26-4-2021</a:t>
+              <a:t>27-4-2021</a:t>
             </a:fld>
             <a:endParaRPr lang="nl-NL"/>
           </a:p>
@@ -1440,7 +1441,7 @@
           <a:p>
             <a:fld id="{F041F224-4157-43B9-983D-12BB641F44A6}" type="datetime1">
               <a:rPr lang="nl-NL" smtClean="0"/>
-              <a:t>26-4-2021</a:t>
+              <a:t>27-4-2021</a:t>
             </a:fld>
             <a:endParaRPr lang="nl-NL"/>
           </a:p>
@@ -1985,7 +1986,7 @@
           <a:p>
             <a:fld id="{7889DFE0-2F5B-400B-A2F7-7D99EE742999}" type="datetime1">
               <a:rPr lang="nl-BE" smtClean="0"/>
-              <a:t>26/04/2021</a:t>
+              <a:t>27/04/2021</a:t>
             </a:fld>
             <a:endParaRPr lang="nl-BE"/>
           </a:p>
@@ -2096,7 +2097,7 @@
           <a:p>
             <a:fld id="{DE3871B0-CA8D-464D-A017-5417A012B0B0}" type="datetime1">
               <a:rPr lang="nl-BE" smtClean="0"/>
-              <a:t>26/04/2021</a:t>
+              <a:t>27/04/2021</a:t>
             </a:fld>
             <a:endParaRPr lang="nl-NL" dirty="0"/>
           </a:p>
@@ -2613,7 +2614,7 @@
           <a:p>
             <a:fld id="{630E9AEB-3B61-40DA-93C9-6A90B0CABC81}" type="datetime1">
               <a:rPr lang="nl-BE" smtClean="0"/>
-              <a:t>26/04/2021</a:t>
+              <a:t>27/04/2021</a:t>
             </a:fld>
             <a:endParaRPr lang="nl-NL"/>
           </a:p>
@@ -2896,7 +2897,7 @@
           <a:p>
             <a:fld id="{E1144E98-BADC-43EF-B68C-A900785218B7}" type="datetime1">
               <a:rPr lang="nl-BE" smtClean="0"/>
-              <a:t>26/04/2021</a:t>
+              <a:t>27/04/2021</a:t>
             </a:fld>
             <a:endParaRPr lang="nl-NL"/>
           </a:p>
@@ -3226,7 +3227,7 @@
           <a:p>
             <a:fld id="{15175995-3991-41C4-8A8D-E22DC26039C0}" type="datetime1">
               <a:rPr lang="nl-BE" smtClean="0"/>
-              <a:t>26/04/2021</a:t>
+              <a:t>27/04/2021</a:t>
             </a:fld>
             <a:endParaRPr lang="nl-NL"/>
           </a:p>
@@ -3546,7 +3547,7 @@
           <a:p>
             <a:fld id="{E2C5B7A8-A032-42DC-895A-201AC7DB8646}" type="datetime1">
               <a:rPr lang="nl-BE" smtClean="0"/>
-              <a:t>26/04/2021</a:t>
+              <a:t>27/04/2021</a:t>
             </a:fld>
             <a:endParaRPr lang="nl-NL" dirty="0"/>
           </a:p>
@@ -3867,7 +3868,7 @@
           <a:p>
             <a:fld id="{E8E53C95-01B7-442B-9157-08ED36F76F3C}" type="datetime1">
               <a:rPr lang="nl-BE" smtClean="0"/>
-              <a:t>26/04/2021</a:t>
+              <a:t>27/04/2021</a:t>
             </a:fld>
             <a:endParaRPr lang="nl-NL" dirty="0"/>
           </a:p>
@@ -4009,7 +4010,7 @@
           <a:p>
             <a:fld id="{50D3EC57-1E68-4A1D-A551-DCE46BD791C6}" type="datetime1">
               <a:rPr lang="nl-BE" smtClean="0"/>
-              <a:t>26/04/2021</a:t>
+              <a:t>27/04/2021</a:t>
             </a:fld>
             <a:endParaRPr lang="nl-NL"/>
           </a:p>
@@ -4493,7 +4494,7 @@
           <a:p>
             <a:fld id="{7FA88303-CC7E-4D0C-BB25-E38DFC5B13BB}" type="datetime1">
               <a:rPr lang="nl-BE" smtClean="0"/>
-              <a:t>26/04/2021</a:t>
+              <a:t>27/04/2021</a:t>
             </a:fld>
             <a:endParaRPr lang="nl-NL" dirty="0"/>
           </a:p>
@@ -4614,7 +4615,7 @@
           <a:p>
             <a:fld id="{290E1377-46D8-4210-B7FF-1512E92E466C}" type="datetime1">
               <a:rPr lang="nl-BE" smtClean="0"/>
-              <a:t>26/04/2021</a:t>
+              <a:t>27/04/2021</a:t>
             </a:fld>
             <a:endParaRPr lang="nl-NL"/>
           </a:p>
@@ -4735,7 +4736,7 @@
           <a:p>
             <a:fld id="{FD3B2FE4-CC50-43C1-B18E-5643057D1080}" type="datetime1">
               <a:rPr lang="nl-BE" smtClean="0"/>
-              <a:t>26/04/2021</a:t>
+              <a:t>27/04/2021</a:t>
             </a:fld>
             <a:endParaRPr lang="nl-NL"/>
           </a:p>
@@ -4917,7 +4918,7 @@
           <a:p>
             <a:fld id="{6538D7E1-880B-4291-B19F-A3787A4C00CC}" type="datetime1">
               <a:rPr lang="nl-BE" smtClean="0"/>
-              <a:t>26/04/2021</a:t>
+              <a:t>27/04/2021</a:t>
             </a:fld>
             <a:endParaRPr lang="nl-NL" dirty="0"/>
           </a:p>
@@ -5201,7 +5202,7 @@
           <a:p>
             <a:fld id="{F272EF29-7C63-44F3-9C9A-F68D6821878F}" type="datetime1">
               <a:rPr lang="nl-BE" smtClean="0"/>
-              <a:t>26/04/2021</a:t>
+              <a:t>27/04/2021</a:t>
             </a:fld>
             <a:endParaRPr lang="nl-NL" dirty="0"/>
           </a:p>
@@ -5844,7 +5845,7 @@
           <a:p>
             <a:fld id="{9EA81302-6EA0-4065-BC26-73D5CB3FD901}" type="datetime1">
               <a:rPr lang="nl-BE" smtClean="0"/>
-              <a:t>26/04/2021</a:t>
+              <a:t>27/04/2021</a:t>
             </a:fld>
             <a:endParaRPr lang="nl-NL" dirty="0"/>
           </a:p>
@@ -6400,6 +6401,559 @@
       </p:grpSpPr>
       <p:sp>
         <p:nvSpPr>
+          <p:cNvPr id="2" name="Footer Placeholder 1">
+            <a:extLst>
+              <a:ext uri="{FF2B5EF4-FFF2-40B4-BE49-F238E27FC236}">
+                <a16:creationId xmlns:a16="http://schemas.microsoft.com/office/drawing/2014/main" id="{9379EB2B-0A26-4B70-BF91-2255D2F4EB43}"/>
+              </a:ext>
+            </a:extLst>
+          </p:cNvPr>
+          <p:cNvSpPr>
+            <a:spLocks noGrp="1"/>
+          </p:cNvSpPr>
+          <p:nvPr>
+            <p:ph type="ftr" sz="quarter" idx="11"/>
+          </p:nvPr>
+        </p:nvSpPr>
+        <p:spPr/>
+        <p:txBody>
+          <a:bodyPr/>
+          <a:lstStyle/>
+          <a:p>
+            <a:r>
+              <a:rPr lang="en-US"/>
+              <a:t>Research Data Management Competence Centre (RDM-CC)</a:t>
+            </a:r>
+            <a:endParaRPr lang="nl-NL" dirty="0"/>
+          </a:p>
+        </p:txBody>
+      </p:sp>
+      <p:sp>
+        <p:nvSpPr>
+          <p:cNvPr id="3" name="Slide Number Placeholder 2">
+            <a:extLst>
+              <a:ext uri="{FF2B5EF4-FFF2-40B4-BE49-F238E27FC236}">
+                <a16:creationId xmlns:a16="http://schemas.microsoft.com/office/drawing/2014/main" id="{753646B9-9BC5-4833-9E49-BEECAA0E9003}"/>
+              </a:ext>
+            </a:extLst>
+          </p:cNvPr>
+          <p:cNvSpPr>
+            <a:spLocks noGrp="1"/>
+          </p:cNvSpPr>
+          <p:nvPr>
+            <p:ph type="sldNum" sz="quarter" idx="12"/>
+          </p:nvPr>
+        </p:nvSpPr>
+        <p:spPr/>
+        <p:txBody>
+          <a:bodyPr/>
+          <a:lstStyle/>
+          <a:p>
+            <a:fld id="{0A297500-7527-634B-90F4-69D0994C32B4}" type="slidenum">
+              <a:rPr lang="nl-NL" smtClean="0"/>
+              <a:pPr/>
+              <a:t>10</a:t>
+            </a:fld>
+            <a:endParaRPr lang="nl-NL" dirty="0"/>
+          </a:p>
+        </p:txBody>
+      </p:sp>
+      <p:sp>
+        <p:nvSpPr>
+          <p:cNvPr id="5" name="Title 4">
+            <a:extLst>
+              <a:ext uri="{FF2B5EF4-FFF2-40B4-BE49-F238E27FC236}">
+                <a16:creationId xmlns:a16="http://schemas.microsoft.com/office/drawing/2014/main" id="{CF28B863-9796-4D61-BDFF-59D6D56B4ECD}"/>
+              </a:ext>
+            </a:extLst>
+          </p:cNvPr>
+          <p:cNvSpPr>
+            <a:spLocks noGrp="1"/>
+          </p:cNvSpPr>
+          <p:nvPr>
+            <p:ph type="title"/>
+          </p:nvPr>
+        </p:nvSpPr>
+        <p:spPr/>
+        <p:txBody>
+          <a:bodyPr/>
+          <a:lstStyle/>
+          <a:p>
+            <a:r>
+              <a:rPr lang="en-US" dirty="0"/>
+              <a:t>Demo admin functions</a:t>
+            </a:r>
+            <a:endParaRPr lang="nl-BE" dirty="0"/>
+          </a:p>
+        </p:txBody>
+      </p:sp>
+      <p:sp>
+        <p:nvSpPr>
+          <p:cNvPr id="6" name="Content Placeholder 1">
+            <a:extLst>
+              <a:ext uri="{FF2B5EF4-FFF2-40B4-BE49-F238E27FC236}">
+                <a16:creationId xmlns:a16="http://schemas.microsoft.com/office/drawing/2014/main" id="{B573F86C-4E2C-4AC3-8CE4-F20A4E05F28D}"/>
+              </a:ext>
+            </a:extLst>
+          </p:cNvPr>
+          <p:cNvSpPr txBox="1">
+            <a:spLocks/>
+          </p:cNvSpPr>
+          <p:nvPr/>
+        </p:nvSpPr>
+        <p:spPr>
+          <a:xfrm>
+            <a:off x="576000" y="1656000"/>
+            <a:ext cx="11041200" cy="4464000"/>
+          </a:xfrm>
+          <a:prstGeom prst="rect">
+            <a:avLst/>
+          </a:prstGeom>
+        </p:spPr>
+        <p:txBody>
+          <a:bodyPr/>
+          <a:lstStyle>
+            <a:lvl1pPr marL="228600" indent="-228600" algn="l" defTabSz="914400" rtl="0" eaLnBrk="1" latinLnBrk="0" hangingPunct="1">
+              <a:lnSpc>
+                <a:spcPct val="100000"/>
+              </a:lnSpc>
+              <a:spcBef>
+                <a:spcPts val="1000"/>
+              </a:spcBef>
+              <a:buFont typeface="Arial"/>
+              <a:buChar char="•"/>
+              <a:defRPr sz="2400" kern="1200" baseline="0">
+                <a:solidFill>
+                  <a:schemeClr val="tx1"/>
+                </a:solidFill>
+                <a:latin typeface="Arial" charset="0"/>
+                <a:ea typeface="+mn-ea"/>
+                <a:cs typeface="+mn-cs"/>
+              </a:defRPr>
+            </a:lvl1pPr>
+            <a:lvl2pPr marL="685800" indent="-228600" algn="l" defTabSz="914400" rtl="0" eaLnBrk="1" latinLnBrk="0" hangingPunct="1">
+              <a:lnSpc>
+                <a:spcPct val="100000"/>
+              </a:lnSpc>
+              <a:spcBef>
+                <a:spcPts val="500"/>
+              </a:spcBef>
+              <a:buFont typeface="Arial"/>
+              <a:buChar char="•"/>
+              <a:defRPr sz="2400" kern="1200" baseline="0">
+                <a:solidFill>
+                  <a:schemeClr val="tx1"/>
+                </a:solidFill>
+                <a:latin typeface="Arial" charset="0"/>
+                <a:ea typeface="+mn-ea"/>
+                <a:cs typeface="+mn-cs"/>
+              </a:defRPr>
+            </a:lvl2pPr>
+            <a:lvl3pPr marL="1143000" indent="-228600" algn="l" defTabSz="914400" rtl="0" eaLnBrk="1" latinLnBrk="0" hangingPunct="1">
+              <a:lnSpc>
+                <a:spcPct val="100000"/>
+              </a:lnSpc>
+              <a:spcBef>
+                <a:spcPts val="500"/>
+              </a:spcBef>
+              <a:buFont typeface="Arial"/>
+              <a:buChar char="•"/>
+              <a:defRPr sz="2000" kern="1200" baseline="0">
+                <a:solidFill>
+                  <a:schemeClr val="tx1"/>
+                </a:solidFill>
+                <a:latin typeface="Arial" charset="0"/>
+                <a:ea typeface="+mn-ea"/>
+                <a:cs typeface="+mn-cs"/>
+              </a:defRPr>
+            </a:lvl3pPr>
+            <a:lvl4pPr marL="1600200" indent="-228600" algn="l" defTabSz="914400" rtl="0" eaLnBrk="1" latinLnBrk="0" hangingPunct="1">
+              <a:lnSpc>
+                <a:spcPct val="100000"/>
+              </a:lnSpc>
+              <a:spcBef>
+                <a:spcPts val="500"/>
+              </a:spcBef>
+              <a:buFont typeface="Arial"/>
+              <a:buChar char="•"/>
+              <a:defRPr sz="1800" kern="1200" baseline="0">
+                <a:solidFill>
+                  <a:schemeClr val="tx1"/>
+                </a:solidFill>
+                <a:latin typeface="Arial" charset="0"/>
+                <a:ea typeface="+mn-ea"/>
+                <a:cs typeface="+mn-cs"/>
+              </a:defRPr>
+            </a:lvl4pPr>
+            <a:lvl5pPr marL="2057400" indent="-228600" algn="l" defTabSz="914400" rtl="0" eaLnBrk="1" latinLnBrk="0" hangingPunct="1">
+              <a:lnSpc>
+                <a:spcPct val="100000"/>
+              </a:lnSpc>
+              <a:spcBef>
+                <a:spcPts val="500"/>
+              </a:spcBef>
+              <a:buFont typeface="Arial"/>
+              <a:buChar char="•"/>
+              <a:defRPr sz="1800" kern="1200" baseline="0">
+                <a:solidFill>
+                  <a:schemeClr val="tx1"/>
+                </a:solidFill>
+                <a:latin typeface="Arial" charset="0"/>
+                <a:ea typeface="+mn-ea"/>
+                <a:cs typeface="+mn-cs"/>
+              </a:defRPr>
+            </a:lvl5pPr>
+            <a:lvl6pPr marL="2514600" indent="-228600" algn="l" defTabSz="914400" rtl="0" eaLnBrk="1" latinLnBrk="0" hangingPunct="1">
+              <a:lnSpc>
+                <a:spcPct val="90000"/>
+              </a:lnSpc>
+              <a:spcBef>
+                <a:spcPts val="500"/>
+              </a:spcBef>
+              <a:buFont typeface="Arial"/>
+              <a:buChar char="•"/>
+              <a:defRPr sz="1800" kern="1200">
+                <a:solidFill>
+                  <a:schemeClr val="tx1"/>
+                </a:solidFill>
+                <a:latin typeface="+mn-lt"/>
+                <a:ea typeface="+mn-ea"/>
+                <a:cs typeface="+mn-cs"/>
+              </a:defRPr>
+            </a:lvl6pPr>
+            <a:lvl7pPr marL="2971800" indent="-228600" algn="l" defTabSz="914400" rtl="0" eaLnBrk="1" latinLnBrk="0" hangingPunct="1">
+              <a:lnSpc>
+                <a:spcPct val="90000"/>
+              </a:lnSpc>
+              <a:spcBef>
+                <a:spcPts val="500"/>
+              </a:spcBef>
+              <a:buFont typeface="Arial"/>
+              <a:buChar char="•"/>
+              <a:defRPr sz="1800" kern="1200">
+                <a:solidFill>
+                  <a:schemeClr val="tx1"/>
+                </a:solidFill>
+                <a:latin typeface="+mn-lt"/>
+                <a:ea typeface="+mn-ea"/>
+                <a:cs typeface="+mn-cs"/>
+              </a:defRPr>
+            </a:lvl7pPr>
+            <a:lvl8pPr marL="3429000" indent="-228600" algn="l" defTabSz="914400" rtl="0" eaLnBrk="1" latinLnBrk="0" hangingPunct="1">
+              <a:lnSpc>
+                <a:spcPct val="90000"/>
+              </a:lnSpc>
+              <a:spcBef>
+                <a:spcPts val="500"/>
+              </a:spcBef>
+              <a:buFont typeface="Arial"/>
+              <a:buChar char="•"/>
+              <a:defRPr sz="1800" kern="1200">
+                <a:solidFill>
+                  <a:schemeClr val="tx1"/>
+                </a:solidFill>
+                <a:latin typeface="+mn-lt"/>
+                <a:ea typeface="+mn-ea"/>
+                <a:cs typeface="+mn-cs"/>
+              </a:defRPr>
+            </a:lvl8pPr>
+            <a:lvl9pPr marL="3886200" indent="-228600" algn="l" defTabSz="914400" rtl="0" eaLnBrk="1" latinLnBrk="0" hangingPunct="1">
+              <a:lnSpc>
+                <a:spcPct val="90000"/>
+              </a:lnSpc>
+              <a:spcBef>
+                <a:spcPts val="500"/>
+              </a:spcBef>
+              <a:buFont typeface="Arial"/>
+              <a:buChar char="•"/>
+              <a:defRPr sz="1800" kern="1200">
+                <a:solidFill>
+                  <a:schemeClr val="tx1"/>
+                </a:solidFill>
+                <a:latin typeface="+mn-lt"/>
+                <a:ea typeface="+mn-ea"/>
+                <a:cs typeface="+mn-cs"/>
+              </a:defRPr>
+            </a:lvl9pPr>
+          </a:lstStyle>
+          <a:p>
+            <a:endParaRPr lang="nl-BE" dirty="0"/>
+          </a:p>
+        </p:txBody>
+      </p:sp>
+      <p:sp>
+        <p:nvSpPr>
+          <p:cNvPr id="7" name="Content Placeholder 1">
+            <a:extLst>
+              <a:ext uri="{FF2B5EF4-FFF2-40B4-BE49-F238E27FC236}">
+                <a16:creationId xmlns:a16="http://schemas.microsoft.com/office/drawing/2014/main" id="{944A725C-B6F6-42AE-8CEC-94D415A27F0D}"/>
+              </a:ext>
+            </a:extLst>
+          </p:cNvPr>
+          <p:cNvSpPr txBox="1">
+            <a:spLocks/>
+          </p:cNvSpPr>
+          <p:nvPr/>
+        </p:nvSpPr>
+        <p:spPr>
+          <a:xfrm>
+            <a:off x="574800" y="1566000"/>
+            <a:ext cx="11041200" cy="4464000"/>
+          </a:xfrm>
+          <a:prstGeom prst="rect">
+            <a:avLst/>
+          </a:prstGeom>
+        </p:spPr>
+        <p:txBody>
+          <a:bodyPr/>
+          <a:lstStyle>
+            <a:lvl1pPr marL="228600" indent="-228600" algn="l" defTabSz="914400" rtl="0" eaLnBrk="1" latinLnBrk="0" hangingPunct="1">
+              <a:lnSpc>
+                <a:spcPct val="100000"/>
+              </a:lnSpc>
+              <a:spcBef>
+                <a:spcPts val="1000"/>
+              </a:spcBef>
+              <a:buFont typeface="Arial"/>
+              <a:buChar char="•"/>
+              <a:defRPr sz="2400" kern="1200" baseline="0">
+                <a:solidFill>
+                  <a:schemeClr val="tx1"/>
+                </a:solidFill>
+                <a:latin typeface="Arial" charset="0"/>
+                <a:ea typeface="+mn-ea"/>
+                <a:cs typeface="+mn-cs"/>
+              </a:defRPr>
+            </a:lvl1pPr>
+            <a:lvl2pPr marL="685800" indent="-228600" algn="l" defTabSz="914400" rtl="0" eaLnBrk="1" latinLnBrk="0" hangingPunct="1">
+              <a:lnSpc>
+                <a:spcPct val="100000"/>
+              </a:lnSpc>
+              <a:spcBef>
+                <a:spcPts val="500"/>
+              </a:spcBef>
+              <a:buFont typeface="Arial"/>
+              <a:buChar char="•"/>
+              <a:defRPr sz="2400" kern="1200" baseline="0">
+                <a:solidFill>
+                  <a:schemeClr val="tx1"/>
+                </a:solidFill>
+                <a:latin typeface="Arial" charset="0"/>
+                <a:ea typeface="+mn-ea"/>
+                <a:cs typeface="+mn-cs"/>
+              </a:defRPr>
+            </a:lvl2pPr>
+            <a:lvl3pPr marL="1143000" indent="-228600" algn="l" defTabSz="914400" rtl="0" eaLnBrk="1" latinLnBrk="0" hangingPunct="1">
+              <a:lnSpc>
+                <a:spcPct val="100000"/>
+              </a:lnSpc>
+              <a:spcBef>
+                <a:spcPts val="500"/>
+              </a:spcBef>
+              <a:buFont typeface="Arial"/>
+              <a:buChar char="•"/>
+              <a:defRPr sz="2000" kern="1200" baseline="0">
+                <a:solidFill>
+                  <a:schemeClr val="tx1"/>
+                </a:solidFill>
+                <a:latin typeface="Arial" charset="0"/>
+                <a:ea typeface="+mn-ea"/>
+                <a:cs typeface="+mn-cs"/>
+              </a:defRPr>
+            </a:lvl3pPr>
+            <a:lvl4pPr marL="1600200" indent="-228600" algn="l" defTabSz="914400" rtl="0" eaLnBrk="1" latinLnBrk="0" hangingPunct="1">
+              <a:lnSpc>
+                <a:spcPct val="100000"/>
+              </a:lnSpc>
+              <a:spcBef>
+                <a:spcPts val="500"/>
+              </a:spcBef>
+              <a:buFont typeface="Arial"/>
+              <a:buChar char="•"/>
+              <a:defRPr sz="1800" kern="1200" baseline="0">
+                <a:solidFill>
+                  <a:schemeClr val="tx1"/>
+                </a:solidFill>
+                <a:latin typeface="Arial" charset="0"/>
+                <a:ea typeface="+mn-ea"/>
+                <a:cs typeface="+mn-cs"/>
+              </a:defRPr>
+            </a:lvl4pPr>
+            <a:lvl5pPr marL="2057400" indent="-228600" algn="l" defTabSz="914400" rtl="0" eaLnBrk="1" latinLnBrk="0" hangingPunct="1">
+              <a:lnSpc>
+                <a:spcPct val="100000"/>
+              </a:lnSpc>
+              <a:spcBef>
+                <a:spcPts val="500"/>
+              </a:spcBef>
+              <a:buFont typeface="Arial"/>
+              <a:buChar char="•"/>
+              <a:defRPr sz="1800" kern="1200" baseline="0">
+                <a:solidFill>
+                  <a:schemeClr val="tx1"/>
+                </a:solidFill>
+                <a:latin typeface="Arial" charset="0"/>
+                <a:ea typeface="+mn-ea"/>
+                <a:cs typeface="+mn-cs"/>
+              </a:defRPr>
+            </a:lvl5pPr>
+            <a:lvl6pPr marL="2514600" indent="-228600" algn="l" defTabSz="914400" rtl="0" eaLnBrk="1" latinLnBrk="0" hangingPunct="1">
+              <a:lnSpc>
+                <a:spcPct val="90000"/>
+              </a:lnSpc>
+              <a:spcBef>
+                <a:spcPts val="500"/>
+              </a:spcBef>
+              <a:buFont typeface="Arial"/>
+              <a:buChar char="•"/>
+              <a:defRPr sz="1800" kern="1200">
+                <a:solidFill>
+                  <a:schemeClr val="tx1"/>
+                </a:solidFill>
+                <a:latin typeface="+mn-lt"/>
+                <a:ea typeface="+mn-ea"/>
+                <a:cs typeface="+mn-cs"/>
+              </a:defRPr>
+            </a:lvl6pPr>
+            <a:lvl7pPr marL="2971800" indent="-228600" algn="l" defTabSz="914400" rtl="0" eaLnBrk="1" latinLnBrk="0" hangingPunct="1">
+              <a:lnSpc>
+                <a:spcPct val="90000"/>
+              </a:lnSpc>
+              <a:spcBef>
+                <a:spcPts val="500"/>
+              </a:spcBef>
+              <a:buFont typeface="Arial"/>
+              <a:buChar char="•"/>
+              <a:defRPr sz="1800" kern="1200">
+                <a:solidFill>
+                  <a:schemeClr val="tx1"/>
+                </a:solidFill>
+                <a:latin typeface="+mn-lt"/>
+                <a:ea typeface="+mn-ea"/>
+                <a:cs typeface="+mn-cs"/>
+              </a:defRPr>
+            </a:lvl7pPr>
+            <a:lvl8pPr marL="3429000" indent="-228600" algn="l" defTabSz="914400" rtl="0" eaLnBrk="1" latinLnBrk="0" hangingPunct="1">
+              <a:lnSpc>
+                <a:spcPct val="90000"/>
+              </a:lnSpc>
+              <a:spcBef>
+                <a:spcPts val="500"/>
+              </a:spcBef>
+              <a:buFont typeface="Arial"/>
+              <a:buChar char="•"/>
+              <a:defRPr sz="1800" kern="1200">
+                <a:solidFill>
+                  <a:schemeClr val="tx1"/>
+                </a:solidFill>
+                <a:latin typeface="+mn-lt"/>
+                <a:ea typeface="+mn-ea"/>
+                <a:cs typeface="+mn-cs"/>
+              </a:defRPr>
+            </a:lvl8pPr>
+            <a:lvl9pPr marL="3886200" indent="-228600" algn="l" defTabSz="914400" rtl="0" eaLnBrk="1" latinLnBrk="0" hangingPunct="1">
+              <a:lnSpc>
+                <a:spcPct val="90000"/>
+              </a:lnSpc>
+              <a:spcBef>
+                <a:spcPts val="500"/>
+              </a:spcBef>
+              <a:buFont typeface="Arial"/>
+              <a:buChar char="•"/>
+              <a:defRPr sz="1800" kern="1200">
+                <a:solidFill>
+                  <a:schemeClr val="tx1"/>
+                </a:solidFill>
+                <a:latin typeface="+mn-lt"/>
+                <a:ea typeface="+mn-ea"/>
+                <a:cs typeface="+mn-cs"/>
+              </a:defRPr>
+            </a:lvl9pPr>
+          </a:lstStyle>
+          <a:p>
+            <a:r>
+              <a:rPr lang="en-US" dirty="0"/>
+              <a:t>Admin tab</a:t>
+            </a:r>
+          </a:p>
+          <a:p>
+            <a:pPr lvl="1"/>
+            <a:r>
+              <a:rPr lang="en-US" dirty="0"/>
+              <a:t>Users -&gt; add, remove, make group admin</a:t>
+            </a:r>
+          </a:p>
+          <a:p>
+            <a:pPr lvl="1"/>
+            <a:r>
+              <a:rPr lang="en-US" dirty="0"/>
+              <a:t>Administrators tab</a:t>
+            </a:r>
+          </a:p>
+          <a:p>
+            <a:pPr lvl="1"/>
+            <a:r>
+              <a:rPr lang="en-US" dirty="0"/>
+              <a:t>Groups tab: add quota to group, remove</a:t>
+            </a:r>
+          </a:p>
+          <a:p>
+            <a:endParaRPr lang="en-US" dirty="0"/>
+          </a:p>
+          <a:p>
+            <a:r>
+              <a:rPr lang="en-US" dirty="0"/>
+              <a:t>Group tab</a:t>
+            </a:r>
+          </a:p>
+          <a:p>
+            <a:pPr lvl="1"/>
+            <a:r>
+              <a:rPr lang="en-US" dirty="0"/>
+              <a:t>Join group</a:t>
+            </a:r>
+          </a:p>
+          <a:p>
+            <a:pPr lvl="1"/>
+            <a:r>
+              <a:rPr lang="en-US" dirty="0"/>
+              <a:t>Click group: add/remove users, add machines</a:t>
+            </a:r>
+          </a:p>
+        </p:txBody>
+      </p:sp>
+    </p:spTree>
+    <p:extLst>
+      <p:ext uri="{BB962C8B-B14F-4D97-AF65-F5344CB8AC3E}">
+        <p14:creationId xmlns:p14="http://schemas.microsoft.com/office/powerpoint/2010/main" val="2369710276"/>
+      </p:ext>
+    </p:extLst>
+  </p:cSld>
+  <p:clrMapOvr>
+    <a:masterClrMapping/>
+  </p:clrMapOvr>
+</p:sld>
+</file>
+
+<file path=ppt/slides/slide11.xml><?xml version="1.0" encoding="utf-8"?>
+<p:sld xmlns:a="http://schemas.openxmlformats.org/drawingml/2006/main" xmlns:r="http://schemas.openxmlformats.org/officeDocument/2006/relationships" xmlns:p="http://schemas.openxmlformats.org/presentationml/2006/main">
+  <p:cSld>
+    <p:spTree>
+      <p:nvGrpSpPr>
+        <p:cNvPr id="1" name=""/>
+        <p:cNvGrpSpPr/>
+        <p:nvPr/>
+      </p:nvGrpSpPr>
+      <p:grpSpPr>
+        <a:xfrm>
+          <a:off x="0" y="0"/>
+          <a:ext cx="0" cy="0"/>
+          <a:chOff x="0" y="0"/>
+          <a:chExt cx="0" cy="0"/>
+        </a:xfrm>
+      </p:grpSpPr>
+      <p:sp>
+        <p:nvSpPr>
           <p:cNvPr id="2" name="Content Placeholder 1">
             <a:extLst>
               <a:ext uri="{FF2B5EF4-FFF2-40B4-BE49-F238E27FC236}">
@@ -6476,15 +7030,7 @@
             <a:pPr lvl="1"/>
             <a:r>
               <a:rPr lang="en-US" dirty="0"/>
-              <a:t>Add a </a:t>
-            </a:r>
-            <a:r>
-              <a:rPr lang="en-US" dirty="0" err="1"/>
-              <a:t>metada</a:t>
-            </a:r>
-            <a:r>
-              <a:rPr lang="en-US" dirty="0"/>
-              <a:t> attribute</a:t>
+              <a:t>Add a metadata attribute</a:t>
             </a:r>
             <a:endParaRPr lang="nl-BE" dirty="0"/>
           </a:p>
@@ -6541,7 +7087,7 @@
           <a:p>
             <a:fld id="{0A297500-7527-634B-90F4-69D0994C32B4}" type="slidenum">
               <a:rPr lang="nl-NL" smtClean="0"/>
-              <a:t>10</a:t>
+              <a:t>11</a:t>
             </a:fld>
             <a:endParaRPr lang="nl-NL"/>
           </a:p>
@@ -17172,10 +17718,9 @@
           <a:lstStyle/>
           <a:p>
             <a:r>
-              <a:rPr lang="nl-BE" dirty="0" err="1"/>
+              <a:rPr lang="en-US" dirty="0"/>
               <a:t>Authentication</a:t>
             </a:r>
-            <a:endParaRPr lang="nl-BE" dirty="0"/>
           </a:p>
         </p:txBody>
       </p:sp>
@@ -17207,7 +17752,7 @@
         </p:blipFill>
         <p:spPr>
           <a:xfrm>
-            <a:off x="977459" y="2279733"/>
+            <a:off x="977459" y="1698814"/>
             <a:ext cx="914400" cy="914400"/>
           </a:xfrm>
           <a:prstGeom prst="rect">
@@ -17229,7 +17774,7 @@
         </p:nvSpPr>
         <p:spPr>
           <a:xfrm>
-            <a:off x="835777" y="3092819"/>
+            <a:off x="835777" y="2511900"/>
             <a:ext cx="1197764" cy="369332"/>
           </a:xfrm>
           <a:prstGeom prst="rect">
@@ -17273,7 +17818,7 @@
         </p:blipFill>
         <p:spPr>
           <a:xfrm>
-            <a:off x="2648564" y="2040367"/>
+            <a:off x="2648564" y="1459448"/>
             <a:ext cx="1689493" cy="1492932"/>
           </a:xfrm>
           <a:prstGeom prst="rect">
@@ -17295,7 +17840,7 @@
         </p:nvSpPr>
         <p:spPr>
           <a:xfrm>
-            <a:off x="2819764" y="3592455"/>
+            <a:off x="2819764" y="3011536"/>
             <a:ext cx="1390124" cy="369332"/>
           </a:xfrm>
           <a:prstGeom prst="rect">
@@ -17331,7 +17876,7 @@
         </p:nvSpPr>
         <p:spPr>
           <a:xfrm rot="16200000">
-            <a:off x="2195541" y="2624833"/>
+            <a:off x="2195541" y="2043914"/>
             <a:ext cx="216000" cy="540000"/>
           </a:xfrm>
           <a:prstGeom prst="downArrow">
@@ -17396,7 +17941,7 @@
         </p:blipFill>
         <p:spPr>
           <a:xfrm>
-            <a:off x="6145696" y="2713759"/>
+            <a:off x="6145696" y="2132840"/>
             <a:ext cx="1459794" cy="289074"/>
           </a:xfrm>
           <a:prstGeom prst="rect">
@@ -17418,7 +17963,7 @@
         </p:nvSpPr>
         <p:spPr>
           <a:xfrm rot="16200000">
-            <a:off x="5255717" y="2369401"/>
+            <a:off x="5255717" y="1788482"/>
             <a:ext cx="205592" cy="1061272"/>
           </a:xfrm>
           <a:prstGeom prst="downArrow">
@@ -17475,7 +18020,7 @@
         </p:nvSpPr>
         <p:spPr>
           <a:xfrm>
-            <a:off x="4449366" y="2213713"/>
+            <a:off x="4449366" y="1632794"/>
             <a:ext cx="1617751" cy="523220"/>
           </a:xfrm>
           <a:prstGeom prst="rect">
@@ -17519,7 +18064,7 @@
         </p:nvSpPr>
         <p:spPr>
           <a:xfrm rot="16200000">
-            <a:off x="8240569" y="2327660"/>
+            <a:off x="8240569" y="1746741"/>
             <a:ext cx="205592" cy="1061272"/>
           </a:xfrm>
           <a:prstGeom prst="downArrow">
@@ -17590,7 +18135,7 @@
         </p:blipFill>
         <p:spPr>
           <a:xfrm>
-            <a:off x="9153275" y="1756513"/>
+            <a:off x="9153275" y="1175594"/>
             <a:ext cx="914400" cy="914400"/>
           </a:xfrm>
           <a:prstGeom prst="rect">
@@ -17626,7 +18171,7 @@
         </p:blipFill>
         <p:spPr>
           <a:xfrm>
-            <a:off x="9215078" y="2862721"/>
+            <a:off x="9215078" y="2281802"/>
             <a:ext cx="914400" cy="914400"/>
           </a:xfrm>
           <a:prstGeom prst="rect">
@@ -17648,7 +18193,7 @@
         </p:nvSpPr>
         <p:spPr>
           <a:xfrm>
-            <a:off x="10201421" y="1853042"/>
+            <a:off x="10201421" y="1272123"/>
             <a:ext cx="1289135" cy="523220"/>
           </a:xfrm>
           <a:prstGeom prst="rect">
@@ -17692,7 +18237,7 @@
         </p:nvSpPr>
         <p:spPr>
           <a:xfrm>
-            <a:off x="10201422" y="3058311"/>
+            <a:off x="10201422" y="2477392"/>
             <a:ext cx="1289134" cy="523220"/>
           </a:xfrm>
           <a:prstGeom prst="rect">
@@ -17741,8 +18286,8 @@
         </p:nvSpPr>
         <p:spPr>
           <a:xfrm>
-            <a:off x="809488" y="4026666"/>
-            <a:ext cx="7577844" cy="2339102"/>
+            <a:off x="934734" y="3390463"/>
+            <a:ext cx="5239915" cy="3016210"/>
           </a:xfrm>
           <a:prstGeom prst="rect">
             <a:avLst/>
@@ -17750,15 +18295,22 @@
           <a:noFill/>
         </p:spPr>
         <p:txBody>
-          <a:bodyPr wrap="none" rtlCol="0">
+          <a:bodyPr wrap="square" rtlCol="0">
             <a:spAutoFit/>
           </a:bodyPr>
           <a:lstStyle/>
           <a:p>
             <a:r>
-              <a:rPr lang="en-US" b="1" dirty="0"/>
-              <a:t>Roles:</a:t>
-            </a:r>
+              <a:rPr lang="en-US" sz="2400" b="1" dirty="0">
+                <a:solidFill>
+                  <a:schemeClr val="accent1"/>
+                </a:solidFill>
+              </a:rPr>
+              <a:t>User Roles</a:t>
+            </a:r>
+          </a:p>
+          <a:p>
+            <a:endParaRPr lang="en-US" sz="2400" b="1" dirty="0"/>
           </a:p>
           <a:p>
             <a:pPr marL="285750" indent="-285750">
@@ -17771,20 +18323,138 @@
             </a:r>
             <a:r>
               <a:rPr lang="en-US" dirty="0"/>
-              <a:t> user. Access to </a:t>
-            </a:r>
-            <a:r>
-              <a:rPr lang="en-US" dirty="0" err="1"/>
+              <a:t> user</a:t>
+            </a:r>
+          </a:p>
+          <a:p>
+            <a:pPr marL="742950" lvl="1" indent="-285750">
+              <a:buFont typeface="Arial" panose="020B0604020202020204" pitchFamily="34" charset="0"/>
+              <a:buChar char="•"/>
+            </a:pPr>
+            <a:r>
+              <a:rPr lang="en-US" sz="1400" dirty="0"/>
+              <a:t>Access to </a:t>
+            </a:r>
+            <a:r>
+              <a:rPr lang="en-US" sz="1400" dirty="0" err="1"/>
               <a:t>iRODS</a:t>
             </a:r>
             <a:r>
+              <a:rPr lang="en-US" sz="1400" dirty="0"/>
+              <a:t> will be regulated as Facility </a:t>
+            </a:r>
+          </a:p>
+          <a:p>
+            <a:pPr marL="285750" indent="-285750">
+              <a:buFont typeface="Arial" panose="020B0604020202020204" pitchFamily="34" charset="0"/>
+              <a:buChar char="•"/>
+            </a:pPr>
+            <a:r>
               <a:rPr lang="en-US" dirty="0"/>
-              <a:t> will be regulated as Facility in the </a:t>
-            </a:r>
-            <a:r>
-              <a:rPr lang="en-US" dirty="0" err="1"/>
-              <a:t>IdP</a:t>
-            </a:r>
+              <a:t>Group administrator</a:t>
+            </a:r>
+          </a:p>
+          <a:p>
+            <a:pPr marL="742950" lvl="1" indent="-285750">
+              <a:buFont typeface="Arial" panose="020B0604020202020204" pitchFamily="34" charset="0"/>
+              <a:buChar char="•"/>
+            </a:pPr>
+            <a:r>
+              <a:rPr lang="en-US" sz="1400" dirty="0"/>
+              <a:t>Can create groups</a:t>
+            </a:r>
+          </a:p>
+          <a:p>
+            <a:pPr marL="742950" lvl="1" indent="-285750">
+              <a:buFont typeface="Arial" panose="020B0604020202020204" pitchFamily="34" charset="0"/>
+              <a:buChar char="•"/>
+            </a:pPr>
+            <a:r>
+              <a:rPr lang="en-US" sz="1400" dirty="0"/>
+              <a:t>Can join empty groups</a:t>
+            </a:r>
+          </a:p>
+          <a:p>
+            <a:pPr marL="742950" lvl="1" indent="-285750">
+              <a:buFont typeface="Arial" panose="020B0604020202020204" pitchFamily="34" charset="0"/>
+              <a:buChar char="•"/>
+            </a:pPr>
+            <a:r>
+              <a:rPr lang="en-US" sz="1400" dirty="0"/>
+              <a:t>Can edit members of groups they belong to</a:t>
+            </a:r>
+          </a:p>
+          <a:p>
+            <a:pPr marL="285750" indent="-285750">
+              <a:buFont typeface="Arial" panose="020B0604020202020204" pitchFamily="34" charset="0"/>
+              <a:buChar char="•"/>
+            </a:pPr>
+            <a:r>
+              <a:rPr lang="en-US" dirty="0"/>
+              <a:t>Machine user</a:t>
+            </a:r>
+          </a:p>
+          <a:p>
+            <a:pPr marL="742950" lvl="1" indent="-285750">
+              <a:buFont typeface="Arial" panose="020B0604020202020204" pitchFamily="34" charset="0"/>
+              <a:buChar char="•"/>
+            </a:pPr>
+            <a:r>
+              <a:rPr lang="en-US" sz="1400" dirty="0"/>
+              <a:t>long lived tokens</a:t>
+            </a:r>
+          </a:p>
+          <a:p>
+            <a:pPr marL="742950" lvl="1" indent="-285750">
+              <a:buFont typeface="Arial" panose="020B0604020202020204" pitchFamily="34" charset="0"/>
+              <a:buChar char="•"/>
+            </a:pPr>
+            <a:endParaRPr lang="en-US" dirty="0"/>
+          </a:p>
+        </p:txBody>
+      </p:sp>
+      <p:sp>
+        <p:nvSpPr>
+          <p:cNvPr id="17" name="TextBox 16">
+            <a:extLst>
+              <a:ext uri="{FF2B5EF4-FFF2-40B4-BE49-F238E27FC236}">
+                <a16:creationId xmlns:a16="http://schemas.microsoft.com/office/drawing/2014/main" id="{82B86602-B8FB-40EB-A3B8-21B676AEC4C6}"/>
+              </a:ext>
+            </a:extLst>
+          </p:cNvPr>
+          <p:cNvSpPr txBox="1"/>
+          <p:nvPr/>
+        </p:nvSpPr>
+        <p:spPr>
+          <a:xfrm>
+            <a:off x="6377285" y="3390463"/>
+            <a:ext cx="5239915" cy="2431435"/>
+          </a:xfrm>
+          <a:prstGeom prst="rect">
+            <a:avLst/>
+          </a:prstGeom>
+          <a:noFill/>
+        </p:spPr>
+        <p:txBody>
+          <a:bodyPr wrap="square" rtlCol="0">
+            <a:spAutoFit/>
+          </a:bodyPr>
+          <a:lstStyle/>
+          <a:p>
+            <a:r>
+              <a:rPr lang="en-US" sz="2400" b="1" dirty="0">
+                <a:solidFill>
+                  <a:schemeClr val="accent1"/>
+                </a:solidFill>
+              </a:rPr>
+              <a:t>Admin Roles</a:t>
+            </a:r>
+          </a:p>
+          <a:p>
+            <a:pPr marL="285750" indent="-285750">
+              <a:buFont typeface="Arial" panose="020B0604020202020204" pitchFamily="34" charset="0"/>
+              <a:buChar char="•"/>
+            </a:pPr>
             <a:endParaRPr lang="en-US" dirty="0"/>
           </a:p>
           <a:p>
@@ -17964,40 +18634,12 @@
           <a:chExt cx="0" cy="0"/>
         </a:xfrm>
       </p:grpSpPr>
-      <p:sp>
-        <p:nvSpPr>
-          <p:cNvPr id="4" name="Titel 3">
+      <p:pic>
+        <p:nvPicPr>
+          <p:cNvPr id="7" name="Picture 6" descr="Graphical user interface, text, application, email&#10;&#10;Description automatically generated">
             <a:extLst>
               <a:ext uri="{FF2B5EF4-FFF2-40B4-BE49-F238E27FC236}">
-                <a16:creationId xmlns:a16="http://schemas.microsoft.com/office/drawing/2014/main" id="{BF20AFD4-4182-4569-9DAB-D483A7B230F4}"/>
-              </a:ext>
-            </a:extLst>
-          </p:cNvPr>
-          <p:cNvSpPr>
-            <a:spLocks noGrp="1"/>
-          </p:cNvSpPr>
-          <p:nvPr>
-            <p:ph type="title"/>
-          </p:nvPr>
-        </p:nvSpPr>
-        <p:spPr/>
-        <p:txBody>
-          <a:bodyPr/>
-          <a:lstStyle/>
-          <a:p>
-            <a:r>
-              <a:rPr lang="nl-BE" dirty="0"/>
-              <a:t>Login portal</a:t>
-            </a:r>
-          </a:p>
-        </p:txBody>
-      </p:sp>
-      <p:pic>
-        <p:nvPicPr>
-          <p:cNvPr id="5" name="Picture 4">
-            <a:extLst>
-              <a:ext uri="{FF2B5EF4-FFF2-40B4-BE49-F238E27FC236}">
-                <a16:creationId xmlns:a16="http://schemas.microsoft.com/office/drawing/2014/main" id="{402321C7-9409-4688-8386-4B8DD12A309F}"/>
+                <a16:creationId xmlns:a16="http://schemas.microsoft.com/office/drawing/2014/main" id="{96B5721E-E615-47A0-B0F7-9B03105686DF}"/>
               </a:ext>
             </a:extLst>
           </p:cNvPr>
@@ -18014,14 +18656,42 @@
         </p:blipFill>
         <p:spPr>
           <a:xfrm>
-            <a:off x="3830974" y="213689"/>
-            <a:ext cx="6980462" cy="6168331"/>
+            <a:off x="3610735" y="71244"/>
+            <a:ext cx="6907051" cy="6650964"/>
           </a:xfrm>
           <a:prstGeom prst="rect">
             <a:avLst/>
           </a:prstGeom>
         </p:spPr>
       </p:pic>
+      <p:sp>
+        <p:nvSpPr>
+          <p:cNvPr id="4" name="Titel 3">
+            <a:extLst>
+              <a:ext uri="{FF2B5EF4-FFF2-40B4-BE49-F238E27FC236}">
+                <a16:creationId xmlns:a16="http://schemas.microsoft.com/office/drawing/2014/main" id="{BF20AFD4-4182-4569-9DAB-D483A7B230F4}"/>
+              </a:ext>
+            </a:extLst>
+          </p:cNvPr>
+          <p:cNvSpPr>
+            <a:spLocks noGrp="1"/>
+          </p:cNvSpPr>
+          <p:nvPr>
+            <p:ph type="title"/>
+          </p:nvPr>
+        </p:nvSpPr>
+        <p:spPr/>
+        <p:txBody>
+          <a:bodyPr/>
+          <a:lstStyle/>
+          <a:p>
+            <a:r>
+              <a:rPr lang="nl-BE" dirty="0"/>
+              <a:t>Login portal</a:t>
+            </a:r>
+          </a:p>
+        </p:txBody>
+      </p:sp>
       <p:sp>
         <p:nvSpPr>
           <p:cNvPr id="3" name="Rectangle 2">
@@ -18037,7 +18707,7 @@
         <p:spPr>
           <a:xfrm>
             <a:off x="4840941" y="365760"/>
-            <a:ext cx="1387737" cy="311972"/>
+            <a:ext cx="1645920" cy="311972"/>
           </a:xfrm>
           <a:prstGeom prst="rect">
             <a:avLst/>
@@ -18088,8 +18758,8 @@
         </p:nvSpPr>
         <p:spPr>
           <a:xfrm>
-            <a:off x="5550946" y="1830593"/>
-            <a:ext cx="3550023" cy="311972"/>
+            <a:off x="5120640" y="2054709"/>
+            <a:ext cx="3894268" cy="454937"/>
           </a:xfrm>
           <a:prstGeom prst="rect">
             <a:avLst/>
@@ -18140,8 +18810,8 @@
         </p:nvSpPr>
         <p:spPr>
           <a:xfrm>
-            <a:off x="4378362" y="4263614"/>
-            <a:ext cx="5712311" cy="451822"/>
+            <a:off x="3883511" y="4866043"/>
+            <a:ext cx="6368527" cy="451822"/>
           </a:xfrm>
           <a:prstGeom prst="rect">
             <a:avLst/>
@@ -18403,8 +19073,15 @@
           <a:p>
             <a:r>
               <a:rPr lang="en-US" dirty="0"/>
-              <a:t>Go to: irods-icts.t.icts.kuleuven.be</a:t>
-            </a:r>
+              <a:t>Go to: </a:t>
+            </a:r>
+            <a:r>
+              <a:rPr lang="en-US" dirty="0">
+                <a:hlinkClick r:id="rId2"/>
+              </a:rPr>
+              <a:t>https://irods-demo.t.icts.kuleuven.be/</a:t>
+            </a:r>
+            <a:endParaRPr lang="en-US" dirty="0"/>
           </a:p>
           <a:p>
             <a:r>

</xml_diff>